<commit_message>
finished task specific instructions, added testing modes
</commit_message>
<xml_diff>
--- a/tasks/HMM-beads/instructions.pptx
+++ b/tasks/HMM-beads/instructions.pptx
@@ -2,12 +2,14 @@
 <file path=ppt/presentation.xml><?xml version="1.0" encoding="utf-8"?>
 <p:presentation xmlns:a="http://schemas.openxmlformats.org/drawingml/2006/main" xmlns:r="http://schemas.openxmlformats.org/officeDocument/2006/relationships" xmlns:p="http://schemas.openxmlformats.org/presentationml/2006/main" saveSubsetFonts="1">
   <p:sldMasterIdLst>
-    <p:sldMasterId id="2147483660" r:id="rId1"/>
+    <p:sldMasterId id="2147483684" r:id="rId1"/>
   </p:sldMasterIdLst>
   <p:sldIdLst>
     <p:sldId id="256" r:id="rId2"/>
+    <p:sldId id="257" r:id="rId3"/>
+    <p:sldId id="258" r:id="rId4"/>
   </p:sldIdLst>
-  <p:sldSz cx="9144000" cy="6858000" type="screen4x3"/>
+  <p:sldSz cx="9144000" cy="5668963"/>
   <p:notesSz cx="6858000" cy="9144000"/>
   <p:defaultTextStyle>
     <a:defPPr>
@@ -136,15 +138,15 @@
         </p:nvSpPr>
         <p:spPr>
           <a:xfrm>
-            <a:off x="685800" y="1122363"/>
-            <a:ext cx="7772400" cy="2387600"/>
+            <a:off x="1143000" y="927768"/>
+            <a:ext cx="6858000" cy="1973639"/>
           </a:xfrm>
         </p:spPr>
         <p:txBody>
           <a:bodyPr anchor="b"/>
           <a:lstStyle>
             <a:lvl1pPr algn="ctr">
-              <a:defRPr sz="6000"/>
+              <a:defRPr sz="4500"/>
             </a:lvl1pPr>
           </a:lstStyle>
           <a:p>
@@ -168,8 +170,8 @@
         </p:nvSpPr>
         <p:spPr>
           <a:xfrm>
-            <a:off x="1143000" y="3602038"/>
-            <a:ext cx="6858000" cy="1655762"/>
+            <a:off x="1143000" y="2977518"/>
+            <a:ext cx="6858000" cy="1368687"/>
           </a:xfrm>
         </p:spPr>
         <p:txBody>
@@ -177,39 +179,39 @@
           <a:lstStyle>
             <a:lvl1pPr marL="0" indent="0" algn="ctr">
               <a:buNone/>
-              <a:defRPr sz="2400"/>
+              <a:defRPr sz="1800"/>
             </a:lvl1pPr>
-            <a:lvl2pPr marL="457200" indent="0" algn="ctr">
-              <a:buNone/>
-              <a:defRPr sz="2000"/>
+            <a:lvl2pPr marL="342900" indent="0" algn="ctr">
+              <a:buNone/>
+              <a:defRPr sz="1500"/>
             </a:lvl2pPr>
-            <a:lvl3pPr marL="914400" indent="0" algn="ctr">
-              <a:buNone/>
-              <a:defRPr sz="1800"/>
+            <a:lvl3pPr marL="685800" indent="0" algn="ctr">
+              <a:buNone/>
+              <a:defRPr sz="1350"/>
             </a:lvl3pPr>
-            <a:lvl4pPr marL="1371600" indent="0" algn="ctr">
-              <a:buNone/>
-              <a:defRPr sz="1600"/>
+            <a:lvl4pPr marL="1028700" indent="0" algn="ctr">
+              <a:buNone/>
+              <a:defRPr sz="1200"/>
             </a:lvl4pPr>
-            <a:lvl5pPr marL="1828800" indent="0" algn="ctr">
-              <a:buNone/>
-              <a:defRPr sz="1600"/>
+            <a:lvl5pPr marL="1371600" indent="0" algn="ctr">
+              <a:buNone/>
+              <a:defRPr sz="1200"/>
             </a:lvl5pPr>
-            <a:lvl6pPr marL="2286000" indent="0" algn="ctr">
-              <a:buNone/>
-              <a:defRPr sz="1600"/>
+            <a:lvl6pPr marL="1714500" indent="0" algn="ctr">
+              <a:buNone/>
+              <a:defRPr sz="1200"/>
             </a:lvl6pPr>
-            <a:lvl7pPr marL="2743200" indent="0" algn="ctr">
-              <a:buNone/>
-              <a:defRPr sz="1600"/>
+            <a:lvl7pPr marL="2057400" indent="0" algn="ctr">
+              <a:buNone/>
+              <a:defRPr sz="1200"/>
             </a:lvl7pPr>
-            <a:lvl8pPr marL="3200400" indent="0" algn="ctr">
-              <a:buNone/>
-              <a:defRPr sz="1600"/>
+            <a:lvl8pPr marL="2400300" indent="0" algn="ctr">
+              <a:buNone/>
+              <a:defRPr sz="1200"/>
             </a:lvl8pPr>
-            <a:lvl9pPr marL="3657600" indent="0" algn="ctr">
-              <a:buNone/>
-              <a:defRPr sz="1600"/>
+            <a:lvl9pPr marL="2743200" indent="0" algn="ctr">
+              <a:buNone/>
+              <a:defRPr sz="1200"/>
             </a:lvl9pPr>
           </a:lstStyle>
           <a:p>
@@ -236,9 +238,9 @@
           <a:bodyPr/>
           <a:lstStyle/>
           <a:p>
-            <a:fld id="{2ED5CD3F-891E-4565-954D-8C78C6B7330B}" type="datetimeFigureOut">
+            <a:fld id="{12FD65F8-89BB-42A3-B7C5-99E87ABACD03}" type="datetimeFigureOut">
               <a:rPr lang="en-US" smtClean="0"/>
-              <a:t>10/3/2022</a:t>
+              <a:t>10/6/2022</a:t>
             </a:fld>
             <a:endParaRPr lang="en-US"/>
           </a:p>
@@ -278,7 +280,7 @@
           <a:bodyPr/>
           <a:lstStyle/>
           <a:p>
-            <a:fld id="{4744FD22-82CA-4BEA-ACC8-12A6322D3ADD}" type="slidenum">
+            <a:fld id="{E8D8730A-BBD7-4364-871B-2AD73562DE47}" type="slidenum">
               <a:rPr lang="en-US" smtClean="0"/>
               <a:t>‹#›</a:t>
             </a:fld>
@@ -289,7 +291,7 @@
     </p:spTree>
     <p:extLst>
       <p:ext uri="{BB962C8B-B14F-4D97-AF65-F5344CB8AC3E}">
-        <p14:creationId xmlns:p14="http://schemas.microsoft.com/office/powerpoint/2010/main" val="559733637"/>
+        <p14:creationId xmlns:p14="http://schemas.microsoft.com/office/powerpoint/2010/main" val="560478309"/>
       </p:ext>
     </p:extLst>
   </p:cSld>
@@ -406,9 +408,9 @@
           <a:bodyPr/>
           <a:lstStyle/>
           <a:p>
-            <a:fld id="{2ED5CD3F-891E-4565-954D-8C78C6B7330B}" type="datetimeFigureOut">
+            <a:fld id="{12FD65F8-89BB-42A3-B7C5-99E87ABACD03}" type="datetimeFigureOut">
               <a:rPr lang="en-US" smtClean="0"/>
-              <a:t>10/3/2022</a:t>
+              <a:t>10/6/2022</a:t>
             </a:fld>
             <a:endParaRPr lang="en-US"/>
           </a:p>
@@ -448,7 +450,7 @@
           <a:bodyPr/>
           <a:lstStyle/>
           <a:p>
-            <a:fld id="{4744FD22-82CA-4BEA-ACC8-12A6322D3ADD}" type="slidenum">
+            <a:fld id="{E8D8730A-BBD7-4364-871B-2AD73562DE47}" type="slidenum">
               <a:rPr lang="en-US" smtClean="0"/>
               <a:t>‹#›</a:t>
             </a:fld>
@@ -459,7 +461,7 @@
     </p:spTree>
     <p:extLst>
       <p:ext uri="{BB962C8B-B14F-4D97-AF65-F5344CB8AC3E}">
-        <p14:creationId xmlns:p14="http://schemas.microsoft.com/office/powerpoint/2010/main" val="1759280228"/>
+        <p14:creationId xmlns:p14="http://schemas.microsoft.com/office/powerpoint/2010/main" val="4148376759"/>
       </p:ext>
     </p:extLst>
   </p:cSld>
@@ -498,8 +500,8 @@
         </p:nvSpPr>
         <p:spPr>
           <a:xfrm>
-            <a:off x="6543675" y="365125"/>
-            <a:ext cx="1971675" cy="5811838"/>
+            <a:off x="6543675" y="301820"/>
+            <a:ext cx="1971675" cy="4804184"/>
           </a:xfrm>
         </p:spPr>
         <p:txBody>
@@ -526,8 +528,8 @@
         </p:nvSpPr>
         <p:spPr>
           <a:xfrm>
-            <a:off x="628650" y="365125"/>
-            <a:ext cx="5800725" cy="5811838"/>
+            <a:off x="628650" y="301820"/>
+            <a:ext cx="5800725" cy="4804184"/>
           </a:xfrm>
         </p:spPr>
         <p:txBody>
@@ -586,9 +588,9 @@
           <a:bodyPr/>
           <a:lstStyle/>
           <a:p>
-            <a:fld id="{2ED5CD3F-891E-4565-954D-8C78C6B7330B}" type="datetimeFigureOut">
+            <a:fld id="{12FD65F8-89BB-42A3-B7C5-99E87ABACD03}" type="datetimeFigureOut">
               <a:rPr lang="en-US" smtClean="0"/>
-              <a:t>10/3/2022</a:t>
+              <a:t>10/6/2022</a:t>
             </a:fld>
             <a:endParaRPr lang="en-US"/>
           </a:p>
@@ -628,7 +630,7 @@
           <a:bodyPr/>
           <a:lstStyle/>
           <a:p>
-            <a:fld id="{4744FD22-82CA-4BEA-ACC8-12A6322D3ADD}" type="slidenum">
+            <a:fld id="{E8D8730A-BBD7-4364-871B-2AD73562DE47}" type="slidenum">
               <a:rPr lang="en-US" smtClean="0"/>
               <a:t>‹#›</a:t>
             </a:fld>
@@ -639,7 +641,7 @@
     </p:spTree>
     <p:extLst>
       <p:ext uri="{BB962C8B-B14F-4D97-AF65-F5344CB8AC3E}">
-        <p14:creationId xmlns:p14="http://schemas.microsoft.com/office/powerpoint/2010/main" val="1390120260"/>
+        <p14:creationId xmlns:p14="http://schemas.microsoft.com/office/powerpoint/2010/main" val="805762815"/>
       </p:ext>
     </p:extLst>
   </p:cSld>
@@ -756,9 +758,9 @@
           <a:bodyPr/>
           <a:lstStyle/>
           <a:p>
-            <a:fld id="{2ED5CD3F-891E-4565-954D-8C78C6B7330B}" type="datetimeFigureOut">
+            <a:fld id="{12FD65F8-89BB-42A3-B7C5-99E87ABACD03}" type="datetimeFigureOut">
               <a:rPr lang="en-US" smtClean="0"/>
-              <a:t>10/3/2022</a:t>
+              <a:t>10/6/2022</a:t>
             </a:fld>
             <a:endParaRPr lang="en-US"/>
           </a:p>
@@ -798,7 +800,7 @@
           <a:bodyPr/>
           <a:lstStyle/>
           <a:p>
-            <a:fld id="{4744FD22-82CA-4BEA-ACC8-12A6322D3ADD}" type="slidenum">
+            <a:fld id="{E8D8730A-BBD7-4364-871B-2AD73562DE47}" type="slidenum">
               <a:rPr lang="en-US" smtClean="0"/>
               <a:t>‹#›</a:t>
             </a:fld>
@@ -809,7 +811,7 @@
     </p:spTree>
     <p:extLst>
       <p:ext uri="{BB962C8B-B14F-4D97-AF65-F5344CB8AC3E}">
-        <p14:creationId xmlns:p14="http://schemas.microsoft.com/office/powerpoint/2010/main" val="1608459995"/>
+        <p14:creationId xmlns:p14="http://schemas.microsoft.com/office/powerpoint/2010/main" val="3768606669"/>
       </p:ext>
     </p:extLst>
   </p:cSld>
@@ -848,15 +850,15 @@
         </p:nvSpPr>
         <p:spPr>
           <a:xfrm>
-            <a:off x="623888" y="1709739"/>
-            <a:ext cx="7886700" cy="2852737"/>
+            <a:off x="623888" y="1413305"/>
+            <a:ext cx="7886700" cy="2358131"/>
           </a:xfrm>
         </p:spPr>
         <p:txBody>
           <a:bodyPr anchor="b"/>
           <a:lstStyle>
             <a:lvl1pPr>
-              <a:defRPr sz="6000"/>
+              <a:defRPr sz="4500"/>
             </a:lvl1pPr>
           </a:lstStyle>
           <a:p>
@@ -880,8 +882,8 @@
         </p:nvSpPr>
         <p:spPr>
           <a:xfrm>
-            <a:off x="623888" y="4589464"/>
-            <a:ext cx="7886700" cy="1500187"/>
+            <a:off x="623888" y="3793744"/>
+            <a:ext cx="7886700" cy="1240085"/>
           </a:xfrm>
         </p:spPr>
         <p:txBody>
@@ -889,15 +891,17 @@
           <a:lstStyle>
             <a:lvl1pPr marL="0" indent="0">
               <a:buNone/>
-              <a:defRPr sz="2400">
+              <a:defRPr sz="1800">
                 <a:solidFill>
-                  <a:schemeClr val="tx1"/>
+                  <a:schemeClr val="tx1">
+                    <a:tint val="75000"/>
+                  </a:schemeClr>
                 </a:solidFill>
               </a:defRPr>
             </a:lvl1pPr>
-            <a:lvl2pPr marL="457200" indent="0">
-              <a:buNone/>
-              <a:defRPr sz="2000">
+            <a:lvl2pPr marL="342900" indent="0">
+              <a:buNone/>
+              <a:defRPr sz="1500">
                 <a:solidFill>
                   <a:schemeClr val="tx1">
                     <a:tint val="75000"/>
@@ -905,9 +909,9 @@
                 </a:solidFill>
               </a:defRPr>
             </a:lvl2pPr>
-            <a:lvl3pPr marL="914400" indent="0">
-              <a:buNone/>
-              <a:defRPr sz="1800">
+            <a:lvl3pPr marL="685800" indent="0">
+              <a:buNone/>
+              <a:defRPr sz="1350">
                 <a:solidFill>
                   <a:schemeClr val="tx1">
                     <a:tint val="75000"/>
@@ -915,9 +919,9 @@
                 </a:solidFill>
               </a:defRPr>
             </a:lvl3pPr>
-            <a:lvl4pPr marL="1371600" indent="0">
-              <a:buNone/>
-              <a:defRPr sz="1600">
+            <a:lvl4pPr marL="1028700" indent="0">
+              <a:buNone/>
+              <a:defRPr sz="1200">
                 <a:solidFill>
                   <a:schemeClr val="tx1">
                     <a:tint val="75000"/>
@@ -925,9 +929,9 @@
                 </a:solidFill>
               </a:defRPr>
             </a:lvl4pPr>
-            <a:lvl5pPr marL="1828800" indent="0">
-              <a:buNone/>
-              <a:defRPr sz="1600">
+            <a:lvl5pPr marL="1371600" indent="0">
+              <a:buNone/>
+              <a:defRPr sz="1200">
                 <a:solidFill>
                   <a:schemeClr val="tx1">
                     <a:tint val="75000"/>
@@ -935,9 +939,9 @@
                 </a:solidFill>
               </a:defRPr>
             </a:lvl5pPr>
-            <a:lvl6pPr marL="2286000" indent="0">
-              <a:buNone/>
-              <a:defRPr sz="1600">
+            <a:lvl6pPr marL="1714500" indent="0">
+              <a:buNone/>
+              <a:defRPr sz="1200">
                 <a:solidFill>
                   <a:schemeClr val="tx1">
                     <a:tint val="75000"/>
@@ -945,9 +949,9 @@
                 </a:solidFill>
               </a:defRPr>
             </a:lvl6pPr>
-            <a:lvl7pPr marL="2743200" indent="0">
-              <a:buNone/>
-              <a:defRPr sz="1600">
+            <a:lvl7pPr marL="2057400" indent="0">
+              <a:buNone/>
+              <a:defRPr sz="1200">
                 <a:solidFill>
                   <a:schemeClr val="tx1">
                     <a:tint val="75000"/>
@@ -955,9 +959,9 @@
                 </a:solidFill>
               </a:defRPr>
             </a:lvl7pPr>
-            <a:lvl8pPr marL="3200400" indent="0">
-              <a:buNone/>
-              <a:defRPr sz="1600">
+            <a:lvl8pPr marL="2400300" indent="0">
+              <a:buNone/>
+              <a:defRPr sz="1200">
                 <a:solidFill>
                   <a:schemeClr val="tx1">
                     <a:tint val="75000"/>
@@ -965,9 +969,9 @@
                 </a:solidFill>
               </a:defRPr>
             </a:lvl8pPr>
-            <a:lvl9pPr marL="3657600" indent="0">
-              <a:buNone/>
-              <a:defRPr sz="1600">
+            <a:lvl9pPr marL="2743200" indent="0">
+              <a:buNone/>
+              <a:defRPr sz="1200">
                 <a:solidFill>
                   <a:schemeClr val="tx1">
                     <a:tint val="75000"/>
@@ -1000,9 +1004,9 @@
           <a:bodyPr/>
           <a:lstStyle/>
           <a:p>
-            <a:fld id="{2ED5CD3F-891E-4565-954D-8C78C6B7330B}" type="datetimeFigureOut">
+            <a:fld id="{12FD65F8-89BB-42A3-B7C5-99E87ABACD03}" type="datetimeFigureOut">
               <a:rPr lang="en-US" smtClean="0"/>
-              <a:t>10/3/2022</a:t>
+              <a:t>10/6/2022</a:t>
             </a:fld>
             <a:endParaRPr lang="en-US"/>
           </a:p>
@@ -1042,7 +1046,7 @@
           <a:bodyPr/>
           <a:lstStyle/>
           <a:p>
-            <a:fld id="{4744FD22-82CA-4BEA-ACC8-12A6322D3ADD}" type="slidenum">
+            <a:fld id="{E8D8730A-BBD7-4364-871B-2AD73562DE47}" type="slidenum">
               <a:rPr lang="en-US" smtClean="0"/>
               <a:t>‹#›</a:t>
             </a:fld>
@@ -1053,7 +1057,7 @@
     </p:spTree>
     <p:extLst>
       <p:ext uri="{BB962C8B-B14F-4D97-AF65-F5344CB8AC3E}">
-        <p14:creationId xmlns:p14="http://schemas.microsoft.com/office/powerpoint/2010/main" val="47953150"/>
+        <p14:creationId xmlns:p14="http://schemas.microsoft.com/office/powerpoint/2010/main" val="3449305664"/>
       </p:ext>
     </p:extLst>
   </p:cSld>
@@ -1115,8 +1119,8 @@
         </p:nvSpPr>
         <p:spPr>
           <a:xfrm>
-            <a:off x="628650" y="1825625"/>
-            <a:ext cx="3886200" cy="4351338"/>
+            <a:off x="628650" y="1509099"/>
+            <a:ext cx="3886200" cy="3596905"/>
           </a:xfrm>
         </p:spPr>
         <p:txBody>
@@ -1172,8 +1176,8 @@
         </p:nvSpPr>
         <p:spPr>
           <a:xfrm>
-            <a:off x="4629150" y="1825625"/>
-            <a:ext cx="3886200" cy="4351338"/>
+            <a:off x="4629150" y="1509099"/>
+            <a:ext cx="3886200" cy="3596905"/>
           </a:xfrm>
         </p:spPr>
         <p:txBody>
@@ -1232,9 +1236,9 @@
           <a:bodyPr/>
           <a:lstStyle/>
           <a:p>
-            <a:fld id="{2ED5CD3F-891E-4565-954D-8C78C6B7330B}" type="datetimeFigureOut">
+            <a:fld id="{12FD65F8-89BB-42A3-B7C5-99E87ABACD03}" type="datetimeFigureOut">
               <a:rPr lang="en-US" smtClean="0"/>
-              <a:t>10/3/2022</a:t>
+              <a:t>10/6/2022</a:t>
             </a:fld>
             <a:endParaRPr lang="en-US"/>
           </a:p>
@@ -1274,7 +1278,7 @@
           <a:bodyPr/>
           <a:lstStyle/>
           <a:p>
-            <a:fld id="{4744FD22-82CA-4BEA-ACC8-12A6322D3ADD}" type="slidenum">
+            <a:fld id="{E8D8730A-BBD7-4364-871B-2AD73562DE47}" type="slidenum">
               <a:rPr lang="en-US" smtClean="0"/>
               <a:t>‹#›</a:t>
             </a:fld>
@@ -1285,7 +1289,7 @@
     </p:spTree>
     <p:extLst>
       <p:ext uri="{BB962C8B-B14F-4D97-AF65-F5344CB8AC3E}">
-        <p14:creationId xmlns:p14="http://schemas.microsoft.com/office/powerpoint/2010/main" val="3261137427"/>
+        <p14:creationId xmlns:p14="http://schemas.microsoft.com/office/powerpoint/2010/main" val="1840417229"/>
       </p:ext>
     </p:extLst>
   </p:cSld>
@@ -1324,8 +1328,8 @@
         </p:nvSpPr>
         <p:spPr>
           <a:xfrm>
-            <a:off x="629841" y="365126"/>
-            <a:ext cx="7886700" cy="1325563"/>
+            <a:off x="629841" y="301820"/>
+            <a:ext cx="7886700" cy="1095737"/>
           </a:xfrm>
         </p:spPr>
         <p:txBody>
@@ -1352,8 +1356,8 @@
         </p:nvSpPr>
         <p:spPr>
           <a:xfrm>
-            <a:off x="629842" y="1681163"/>
-            <a:ext cx="3868340" cy="823912"/>
+            <a:off x="629842" y="1389683"/>
+            <a:ext cx="3868340" cy="681063"/>
           </a:xfrm>
         </p:spPr>
         <p:txBody>
@@ -1361,39 +1365,39 @@
           <a:lstStyle>
             <a:lvl1pPr marL="0" indent="0">
               <a:buNone/>
-              <a:defRPr sz="2400" b="1"/>
+              <a:defRPr sz="1800" b="1"/>
             </a:lvl1pPr>
-            <a:lvl2pPr marL="457200" indent="0">
-              <a:buNone/>
-              <a:defRPr sz="2000" b="1"/>
+            <a:lvl2pPr marL="342900" indent="0">
+              <a:buNone/>
+              <a:defRPr sz="1500" b="1"/>
             </a:lvl2pPr>
-            <a:lvl3pPr marL="914400" indent="0">
-              <a:buNone/>
-              <a:defRPr sz="1800" b="1"/>
+            <a:lvl3pPr marL="685800" indent="0">
+              <a:buNone/>
+              <a:defRPr sz="1350" b="1"/>
             </a:lvl3pPr>
-            <a:lvl4pPr marL="1371600" indent="0">
-              <a:buNone/>
-              <a:defRPr sz="1600" b="1"/>
+            <a:lvl4pPr marL="1028700" indent="0">
+              <a:buNone/>
+              <a:defRPr sz="1200" b="1"/>
             </a:lvl4pPr>
-            <a:lvl5pPr marL="1828800" indent="0">
-              <a:buNone/>
-              <a:defRPr sz="1600" b="1"/>
+            <a:lvl5pPr marL="1371600" indent="0">
+              <a:buNone/>
+              <a:defRPr sz="1200" b="1"/>
             </a:lvl5pPr>
-            <a:lvl6pPr marL="2286000" indent="0">
-              <a:buNone/>
-              <a:defRPr sz="1600" b="1"/>
+            <a:lvl6pPr marL="1714500" indent="0">
+              <a:buNone/>
+              <a:defRPr sz="1200" b="1"/>
             </a:lvl6pPr>
-            <a:lvl7pPr marL="2743200" indent="0">
-              <a:buNone/>
-              <a:defRPr sz="1600" b="1"/>
+            <a:lvl7pPr marL="2057400" indent="0">
+              <a:buNone/>
+              <a:defRPr sz="1200" b="1"/>
             </a:lvl7pPr>
-            <a:lvl8pPr marL="3200400" indent="0">
-              <a:buNone/>
-              <a:defRPr sz="1600" b="1"/>
+            <a:lvl8pPr marL="2400300" indent="0">
+              <a:buNone/>
+              <a:defRPr sz="1200" b="1"/>
             </a:lvl8pPr>
-            <a:lvl9pPr marL="3657600" indent="0">
-              <a:buNone/>
-              <a:defRPr sz="1600" b="1"/>
+            <a:lvl9pPr marL="2743200" indent="0">
+              <a:buNone/>
+              <a:defRPr sz="1200" b="1"/>
             </a:lvl9pPr>
           </a:lstStyle>
           <a:p>
@@ -1417,8 +1421,8 @@
         </p:nvSpPr>
         <p:spPr>
           <a:xfrm>
-            <a:off x="629842" y="2505075"/>
-            <a:ext cx="3868340" cy="3684588"/>
+            <a:off x="629842" y="2070746"/>
+            <a:ext cx="3868340" cy="3045756"/>
           </a:xfrm>
         </p:spPr>
         <p:txBody>
@@ -1474,8 +1478,8 @@
         </p:nvSpPr>
         <p:spPr>
           <a:xfrm>
-            <a:off x="4629150" y="1681163"/>
-            <a:ext cx="3887391" cy="823912"/>
+            <a:off x="4629150" y="1389683"/>
+            <a:ext cx="3887391" cy="681063"/>
           </a:xfrm>
         </p:spPr>
         <p:txBody>
@@ -1483,39 +1487,39 @@
           <a:lstStyle>
             <a:lvl1pPr marL="0" indent="0">
               <a:buNone/>
-              <a:defRPr sz="2400" b="1"/>
+              <a:defRPr sz="1800" b="1"/>
             </a:lvl1pPr>
-            <a:lvl2pPr marL="457200" indent="0">
-              <a:buNone/>
-              <a:defRPr sz="2000" b="1"/>
+            <a:lvl2pPr marL="342900" indent="0">
+              <a:buNone/>
+              <a:defRPr sz="1500" b="1"/>
             </a:lvl2pPr>
-            <a:lvl3pPr marL="914400" indent="0">
-              <a:buNone/>
-              <a:defRPr sz="1800" b="1"/>
+            <a:lvl3pPr marL="685800" indent="0">
+              <a:buNone/>
+              <a:defRPr sz="1350" b="1"/>
             </a:lvl3pPr>
-            <a:lvl4pPr marL="1371600" indent="0">
-              <a:buNone/>
-              <a:defRPr sz="1600" b="1"/>
+            <a:lvl4pPr marL="1028700" indent="0">
+              <a:buNone/>
+              <a:defRPr sz="1200" b="1"/>
             </a:lvl4pPr>
-            <a:lvl5pPr marL="1828800" indent="0">
-              <a:buNone/>
-              <a:defRPr sz="1600" b="1"/>
+            <a:lvl5pPr marL="1371600" indent="0">
+              <a:buNone/>
+              <a:defRPr sz="1200" b="1"/>
             </a:lvl5pPr>
-            <a:lvl6pPr marL="2286000" indent="0">
-              <a:buNone/>
-              <a:defRPr sz="1600" b="1"/>
+            <a:lvl6pPr marL="1714500" indent="0">
+              <a:buNone/>
+              <a:defRPr sz="1200" b="1"/>
             </a:lvl6pPr>
-            <a:lvl7pPr marL="2743200" indent="0">
-              <a:buNone/>
-              <a:defRPr sz="1600" b="1"/>
+            <a:lvl7pPr marL="2057400" indent="0">
+              <a:buNone/>
+              <a:defRPr sz="1200" b="1"/>
             </a:lvl7pPr>
-            <a:lvl8pPr marL="3200400" indent="0">
-              <a:buNone/>
-              <a:defRPr sz="1600" b="1"/>
+            <a:lvl8pPr marL="2400300" indent="0">
+              <a:buNone/>
+              <a:defRPr sz="1200" b="1"/>
             </a:lvl8pPr>
-            <a:lvl9pPr marL="3657600" indent="0">
-              <a:buNone/>
-              <a:defRPr sz="1600" b="1"/>
+            <a:lvl9pPr marL="2743200" indent="0">
+              <a:buNone/>
+              <a:defRPr sz="1200" b="1"/>
             </a:lvl9pPr>
           </a:lstStyle>
           <a:p>
@@ -1539,8 +1543,8 @@
         </p:nvSpPr>
         <p:spPr>
           <a:xfrm>
-            <a:off x="4629150" y="2505075"/>
-            <a:ext cx="3887391" cy="3684588"/>
+            <a:off x="4629150" y="2070746"/>
+            <a:ext cx="3887391" cy="3045756"/>
           </a:xfrm>
         </p:spPr>
         <p:txBody>
@@ -1599,9 +1603,9 @@
           <a:bodyPr/>
           <a:lstStyle/>
           <a:p>
-            <a:fld id="{2ED5CD3F-891E-4565-954D-8C78C6B7330B}" type="datetimeFigureOut">
+            <a:fld id="{12FD65F8-89BB-42A3-B7C5-99E87ABACD03}" type="datetimeFigureOut">
               <a:rPr lang="en-US" smtClean="0"/>
-              <a:t>10/3/2022</a:t>
+              <a:t>10/6/2022</a:t>
             </a:fld>
             <a:endParaRPr lang="en-US"/>
           </a:p>
@@ -1641,7 +1645,7 @@
           <a:bodyPr/>
           <a:lstStyle/>
           <a:p>
-            <a:fld id="{4744FD22-82CA-4BEA-ACC8-12A6322D3ADD}" type="slidenum">
+            <a:fld id="{E8D8730A-BBD7-4364-871B-2AD73562DE47}" type="slidenum">
               <a:rPr lang="en-US" smtClean="0"/>
               <a:t>‹#›</a:t>
             </a:fld>
@@ -1652,7 +1656,7 @@
     </p:spTree>
     <p:extLst>
       <p:ext uri="{BB962C8B-B14F-4D97-AF65-F5344CB8AC3E}">
-        <p14:creationId xmlns:p14="http://schemas.microsoft.com/office/powerpoint/2010/main" val="3027305006"/>
+        <p14:creationId xmlns:p14="http://schemas.microsoft.com/office/powerpoint/2010/main" val="1031803345"/>
       </p:ext>
     </p:extLst>
   </p:cSld>
@@ -1717,9 +1721,9 @@
           <a:bodyPr/>
           <a:lstStyle/>
           <a:p>
-            <a:fld id="{2ED5CD3F-891E-4565-954D-8C78C6B7330B}" type="datetimeFigureOut">
+            <a:fld id="{12FD65F8-89BB-42A3-B7C5-99E87ABACD03}" type="datetimeFigureOut">
               <a:rPr lang="en-US" smtClean="0"/>
-              <a:t>10/3/2022</a:t>
+              <a:t>10/6/2022</a:t>
             </a:fld>
             <a:endParaRPr lang="en-US"/>
           </a:p>
@@ -1759,7 +1763,7 @@
           <a:bodyPr/>
           <a:lstStyle/>
           <a:p>
-            <a:fld id="{4744FD22-82CA-4BEA-ACC8-12A6322D3ADD}" type="slidenum">
+            <a:fld id="{E8D8730A-BBD7-4364-871B-2AD73562DE47}" type="slidenum">
               <a:rPr lang="en-US" smtClean="0"/>
               <a:t>‹#›</a:t>
             </a:fld>
@@ -1770,7 +1774,7 @@
     </p:spTree>
     <p:extLst>
       <p:ext uri="{BB962C8B-B14F-4D97-AF65-F5344CB8AC3E}">
-        <p14:creationId xmlns:p14="http://schemas.microsoft.com/office/powerpoint/2010/main" val="3900307755"/>
+        <p14:creationId xmlns:p14="http://schemas.microsoft.com/office/powerpoint/2010/main" val="1609478860"/>
       </p:ext>
     </p:extLst>
   </p:cSld>
@@ -1812,9 +1816,9 @@
           <a:bodyPr/>
           <a:lstStyle/>
           <a:p>
-            <a:fld id="{2ED5CD3F-891E-4565-954D-8C78C6B7330B}" type="datetimeFigureOut">
+            <a:fld id="{12FD65F8-89BB-42A3-B7C5-99E87ABACD03}" type="datetimeFigureOut">
               <a:rPr lang="en-US" smtClean="0"/>
-              <a:t>10/3/2022</a:t>
+              <a:t>10/6/2022</a:t>
             </a:fld>
             <a:endParaRPr lang="en-US"/>
           </a:p>
@@ -1854,7 +1858,7 @@
           <a:bodyPr/>
           <a:lstStyle/>
           <a:p>
-            <a:fld id="{4744FD22-82CA-4BEA-ACC8-12A6322D3ADD}" type="slidenum">
+            <a:fld id="{E8D8730A-BBD7-4364-871B-2AD73562DE47}" type="slidenum">
               <a:rPr lang="en-US" smtClean="0"/>
               <a:t>‹#›</a:t>
             </a:fld>
@@ -1865,7 +1869,7 @@
     </p:spTree>
     <p:extLst>
       <p:ext uri="{BB962C8B-B14F-4D97-AF65-F5344CB8AC3E}">
-        <p14:creationId xmlns:p14="http://schemas.microsoft.com/office/powerpoint/2010/main" val="2540674775"/>
+        <p14:creationId xmlns:p14="http://schemas.microsoft.com/office/powerpoint/2010/main" val="1152922669"/>
       </p:ext>
     </p:extLst>
   </p:cSld>
@@ -1904,15 +1908,15 @@
         </p:nvSpPr>
         <p:spPr>
           <a:xfrm>
-            <a:off x="629841" y="457200"/>
-            <a:ext cx="2949178" cy="1600200"/>
+            <a:off x="629841" y="377931"/>
+            <a:ext cx="2949178" cy="1322758"/>
           </a:xfrm>
         </p:spPr>
         <p:txBody>
           <a:bodyPr anchor="b"/>
           <a:lstStyle>
             <a:lvl1pPr>
-              <a:defRPr sz="3200"/>
+              <a:defRPr sz="2400"/>
             </a:lvl1pPr>
           </a:lstStyle>
           <a:p>
@@ -1936,39 +1940,39 @@
         </p:nvSpPr>
         <p:spPr>
           <a:xfrm>
-            <a:off x="3887391" y="987426"/>
-            <a:ext cx="4629150" cy="4873625"/>
+            <a:off x="3887391" y="816226"/>
+            <a:ext cx="4629150" cy="4028638"/>
           </a:xfrm>
         </p:spPr>
         <p:txBody>
           <a:bodyPr/>
           <a:lstStyle>
             <a:lvl1pPr>
-              <a:defRPr sz="3200"/>
+              <a:defRPr sz="2400"/>
             </a:lvl1pPr>
             <a:lvl2pPr>
-              <a:defRPr sz="2800"/>
+              <a:defRPr sz="2100"/>
             </a:lvl2pPr>
             <a:lvl3pPr>
-              <a:defRPr sz="2400"/>
+              <a:defRPr sz="1800"/>
             </a:lvl3pPr>
             <a:lvl4pPr>
-              <a:defRPr sz="2000"/>
+              <a:defRPr sz="1500"/>
             </a:lvl4pPr>
             <a:lvl5pPr>
-              <a:defRPr sz="2000"/>
+              <a:defRPr sz="1500"/>
             </a:lvl5pPr>
             <a:lvl6pPr>
-              <a:defRPr sz="2000"/>
+              <a:defRPr sz="1500"/>
             </a:lvl6pPr>
             <a:lvl7pPr>
-              <a:defRPr sz="2000"/>
+              <a:defRPr sz="1500"/>
             </a:lvl7pPr>
             <a:lvl8pPr>
-              <a:defRPr sz="2000"/>
+              <a:defRPr sz="1500"/>
             </a:lvl8pPr>
             <a:lvl9pPr>
-              <a:defRPr sz="2000"/>
+              <a:defRPr sz="1500"/>
             </a:lvl9pPr>
           </a:lstStyle>
           <a:p>
@@ -2021,8 +2025,8 @@
         </p:nvSpPr>
         <p:spPr>
           <a:xfrm>
-            <a:off x="629841" y="2057400"/>
-            <a:ext cx="2949178" cy="3811588"/>
+            <a:off x="629841" y="1700689"/>
+            <a:ext cx="2949178" cy="3150737"/>
           </a:xfrm>
         </p:spPr>
         <p:txBody>
@@ -2030,39 +2034,39 @@
           <a:lstStyle>
             <a:lvl1pPr marL="0" indent="0">
               <a:buNone/>
-              <a:defRPr sz="1600"/>
+              <a:defRPr sz="1200"/>
             </a:lvl1pPr>
-            <a:lvl2pPr marL="457200" indent="0">
-              <a:buNone/>
-              <a:defRPr sz="1400"/>
+            <a:lvl2pPr marL="342900" indent="0">
+              <a:buNone/>
+              <a:defRPr sz="1050"/>
             </a:lvl2pPr>
-            <a:lvl3pPr marL="914400" indent="0">
-              <a:buNone/>
-              <a:defRPr sz="1200"/>
+            <a:lvl3pPr marL="685800" indent="0">
+              <a:buNone/>
+              <a:defRPr sz="900"/>
             </a:lvl3pPr>
-            <a:lvl4pPr marL="1371600" indent="0">
-              <a:buNone/>
-              <a:defRPr sz="1000"/>
+            <a:lvl4pPr marL="1028700" indent="0">
+              <a:buNone/>
+              <a:defRPr sz="750"/>
             </a:lvl4pPr>
-            <a:lvl5pPr marL="1828800" indent="0">
-              <a:buNone/>
-              <a:defRPr sz="1000"/>
+            <a:lvl5pPr marL="1371600" indent="0">
+              <a:buNone/>
+              <a:defRPr sz="750"/>
             </a:lvl5pPr>
-            <a:lvl6pPr marL="2286000" indent="0">
-              <a:buNone/>
-              <a:defRPr sz="1000"/>
+            <a:lvl6pPr marL="1714500" indent="0">
+              <a:buNone/>
+              <a:defRPr sz="750"/>
             </a:lvl6pPr>
-            <a:lvl7pPr marL="2743200" indent="0">
-              <a:buNone/>
-              <a:defRPr sz="1000"/>
+            <a:lvl7pPr marL="2057400" indent="0">
+              <a:buNone/>
+              <a:defRPr sz="750"/>
             </a:lvl7pPr>
-            <a:lvl8pPr marL="3200400" indent="0">
-              <a:buNone/>
-              <a:defRPr sz="1000"/>
+            <a:lvl8pPr marL="2400300" indent="0">
+              <a:buNone/>
+              <a:defRPr sz="750"/>
             </a:lvl8pPr>
-            <a:lvl9pPr marL="3657600" indent="0">
-              <a:buNone/>
-              <a:defRPr sz="1000"/>
+            <a:lvl9pPr marL="2743200" indent="0">
+              <a:buNone/>
+              <a:defRPr sz="750"/>
             </a:lvl9pPr>
           </a:lstStyle>
           <a:p>
@@ -2089,9 +2093,9 @@
           <a:bodyPr/>
           <a:lstStyle/>
           <a:p>
-            <a:fld id="{2ED5CD3F-891E-4565-954D-8C78C6B7330B}" type="datetimeFigureOut">
+            <a:fld id="{12FD65F8-89BB-42A3-B7C5-99E87ABACD03}" type="datetimeFigureOut">
               <a:rPr lang="en-US" smtClean="0"/>
-              <a:t>10/3/2022</a:t>
+              <a:t>10/6/2022</a:t>
             </a:fld>
             <a:endParaRPr lang="en-US"/>
           </a:p>
@@ -2131,7 +2135,7 @@
           <a:bodyPr/>
           <a:lstStyle/>
           <a:p>
-            <a:fld id="{4744FD22-82CA-4BEA-ACC8-12A6322D3ADD}" type="slidenum">
+            <a:fld id="{E8D8730A-BBD7-4364-871B-2AD73562DE47}" type="slidenum">
               <a:rPr lang="en-US" smtClean="0"/>
               <a:t>‹#›</a:t>
             </a:fld>
@@ -2142,7 +2146,7 @@
     </p:spTree>
     <p:extLst>
       <p:ext uri="{BB962C8B-B14F-4D97-AF65-F5344CB8AC3E}">
-        <p14:creationId xmlns:p14="http://schemas.microsoft.com/office/powerpoint/2010/main" val="3539661448"/>
+        <p14:creationId xmlns:p14="http://schemas.microsoft.com/office/powerpoint/2010/main" val="2377453999"/>
       </p:ext>
     </p:extLst>
   </p:cSld>
@@ -2181,15 +2185,15 @@
         </p:nvSpPr>
         <p:spPr>
           <a:xfrm>
-            <a:off x="629841" y="457200"/>
-            <a:ext cx="2949178" cy="1600200"/>
+            <a:off x="629841" y="377931"/>
+            <a:ext cx="2949178" cy="1322758"/>
           </a:xfrm>
         </p:spPr>
         <p:txBody>
           <a:bodyPr anchor="b"/>
           <a:lstStyle>
             <a:lvl1pPr>
-              <a:defRPr sz="3200"/>
+              <a:defRPr sz="2400"/>
             </a:lvl1pPr>
           </a:lstStyle>
           <a:p>
@@ -2213,8 +2217,8 @@
         </p:nvSpPr>
         <p:spPr>
           <a:xfrm>
-            <a:off x="3887391" y="987426"/>
-            <a:ext cx="4629150" cy="4873625"/>
+            <a:off x="3887391" y="816226"/>
+            <a:ext cx="4629150" cy="4028638"/>
           </a:xfrm>
         </p:spPr>
         <p:txBody>
@@ -2222,39 +2226,39 @@
           <a:lstStyle>
             <a:lvl1pPr marL="0" indent="0">
               <a:buNone/>
-              <a:defRPr sz="3200"/>
+              <a:defRPr sz="2400"/>
             </a:lvl1pPr>
-            <a:lvl2pPr marL="457200" indent="0">
-              <a:buNone/>
-              <a:defRPr sz="2800"/>
+            <a:lvl2pPr marL="342900" indent="0">
+              <a:buNone/>
+              <a:defRPr sz="2100"/>
             </a:lvl2pPr>
-            <a:lvl3pPr marL="914400" indent="0">
-              <a:buNone/>
-              <a:defRPr sz="2400"/>
+            <a:lvl3pPr marL="685800" indent="0">
+              <a:buNone/>
+              <a:defRPr sz="1800"/>
             </a:lvl3pPr>
-            <a:lvl4pPr marL="1371600" indent="0">
-              <a:buNone/>
-              <a:defRPr sz="2000"/>
+            <a:lvl4pPr marL="1028700" indent="0">
+              <a:buNone/>
+              <a:defRPr sz="1500"/>
             </a:lvl4pPr>
-            <a:lvl5pPr marL="1828800" indent="0">
-              <a:buNone/>
-              <a:defRPr sz="2000"/>
+            <a:lvl5pPr marL="1371600" indent="0">
+              <a:buNone/>
+              <a:defRPr sz="1500"/>
             </a:lvl5pPr>
-            <a:lvl6pPr marL="2286000" indent="0">
-              <a:buNone/>
-              <a:defRPr sz="2000"/>
+            <a:lvl6pPr marL="1714500" indent="0">
+              <a:buNone/>
+              <a:defRPr sz="1500"/>
             </a:lvl6pPr>
-            <a:lvl7pPr marL="2743200" indent="0">
-              <a:buNone/>
-              <a:defRPr sz="2000"/>
+            <a:lvl7pPr marL="2057400" indent="0">
+              <a:buNone/>
+              <a:defRPr sz="1500"/>
             </a:lvl7pPr>
-            <a:lvl8pPr marL="3200400" indent="0">
-              <a:buNone/>
-              <a:defRPr sz="2000"/>
+            <a:lvl8pPr marL="2400300" indent="0">
+              <a:buNone/>
+              <a:defRPr sz="1500"/>
             </a:lvl8pPr>
-            <a:lvl9pPr marL="3657600" indent="0">
-              <a:buNone/>
-              <a:defRPr sz="2000"/>
+            <a:lvl9pPr marL="2743200" indent="0">
+              <a:buNone/>
+              <a:defRPr sz="1500"/>
             </a:lvl9pPr>
           </a:lstStyle>
           <a:p>
@@ -2278,8 +2282,8 @@
         </p:nvSpPr>
         <p:spPr>
           <a:xfrm>
-            <a:off x="629841" y="2057400"/>
-            <a:ext cx="2949178" cy="3811588"/>
+            <a:off x="629841" y="1700689"/>
+            <a:ext cx="2949178" cy="3150737"/>
           </a:xfrm>
         </p:spPr>
         <p:txBody>
@@ -2287,39 +2291,39 @@
           <a:lstStyle>
             <a:lvl1pPr marL="0" indent="0">
               <a:buNone/>
-              <a:defRPr sz="1600"/>
+              <a:defRPr sz="1200"/>
             </a:lvl1pPr>
-            <a:lvl2pPr marL="457200" indent="0">
-              <a:buNone/>
-              <a:defRPr sz="1400"/>
+            <a:lvl2pPr marL="342900" indent="0">
+              <a:buNone/>
+              <a:defRPr sz="1050"/>
             </a:lvl2pPr>
-            <a:lvl3pPr marL="914400" indent="0">
-              <a:buNone/>
-              <a:defRPr sz="1200"/>
+            <a:lvl3pPr marL="685800" indent="0">
+              <a:buNone/>
+              <a:defRPr sz="900"/>
             </a:lvl3pPr>
-            <a:lvl4pPr marL="1371600" indent="0">
-              <a:buNone/>
-              <a:defRPr sz="1000"/>
+            <a:lvl4pPr marL="1028700" indent="0">
+              <a:buNone/>
+              <a:defRPr sz="750"/>
             </a:lvl4pPr>
-            <a:lvl5pPr marL="1828800" indent="0">
-              <a:buNone/>
-              <a:defRPr sz="1000"/>
+            <a:lvl5pPr marL="1371600" indent="0">
+              <a:buNone/>
+              <a:defRPr sz="750"/>
             </a:lvl5pPr>
-            <a:lvl6pPr marL="2286000" indent="0">
-              <a:buNone/>
-              <a:defRPr sz="1000"/>
+            <a:lvl6pPr marL="1714500" indent="0">
+              <a:buNone/>
+              <a:defRPr sz="750"/>
             </a:lvl6pPr>
-            <a:lvl7pPr marL="2743200" indent="0">
-              <a:buNone/>
-              <a:defRPr sz="1000"/>
+            <a:lvl7pPr marL="2057400" indent="0">
+              <a:buNone/>
+              <a:defRPr sz="750"/>
             </a:lvl7pPr>
-            <a:lvl8pPr marL="3200400" indent="0">
-              <a:buNone/>
-              <a:defRPr sz="1000"/>
+            <a:lvl8pPr marL="2400300" indent="0">
+              <a:buNone/>
+              <a:defRPr sz="750"/>
             </a:lvl8pPr>
-            <a:lvl9pPr marL="3657600" indent="0">
-              <a:buNone/>
-              <a:defRPr sz="1000"/>
+            <a:lvl9pPr marL="2743200" indent="0">
+              <a:buNone/>
+              <a:defRPr sz="750"/>
             </a:lvl9pPr>
           </a:lstStyle>
           <a:p>
@@ -2346,9 +2350,9 @@
           <a:bodyPr/>
           <a:lstStyle/>
           <a:p>
-            <a:fld id="{2ED5CD3F-891E-4565-954D-8C78C6B7330B}" type="datetimeFigureOut">
+            <a:fld id="{12FD65F8-89BB-42A3-B7C5-99E87ABACD03}" type="datetimeFigureOut">
               <a:rPr lang="en-US" smtClean="0"/>
-              <a:t>10/3/2022</a:t>
+              <a:t>10/6/2022</a:t>
             </a:fld>
             <a:endParaRPr lang="en-US"/>
           </a:p>
@@ -2388,7 +2392,7 @@
           <a:bodyPr/>
           <a:lstStyle/>
           <a:p>
-            <a:fld id="{4744FD22-82CA-4BEA-ACC8-12A6322D3ADD}" type="slidenum">
+            <a:fld id="{E8D8730A-BBD7-4364-871B-2AD73562DE47}" type="slidenum">
               <a:rPr lang="en-US" smtClean="0"/>
               <a:t>‹#›</a:t>
             </a:fld>
@@ -2399,7 +2403,7 @@
     </p:spTree>
     <p:extLst>
       <p:ext uri="{BB962C8B-B14F-4D97-AF65-F5344CB8AC3E}">
-        <p14:creationId xmlns:p14="http://schemas.microsoft.com/office/powerpoint/2010/main" val="4139109193"/>
+        <p14:creationId xmlns:p14="http://schemas.microsoft.com/office/powerpoint/2010/main" val="3676862337"/>
       </p:ext>
     </p:extLst>
   </p:cSld>
@@ -2443,8 +2447,8 @@
         </p:nvSpPr>
         <p:spPr>
           <a:xfrm>
-            <a:off x="628650" y="365126"/>
-            <a:ext cx="7886700" cy="1325563"/>
+            <a:off x="628650" y="301820"/>
+            <a:ext cx="7886700" cy="1095737"/>
           </a:xfrm>
           <a:prstGeom prst="rect">
             <a:avLst/>
@@ -2476,8 +2480,8 @@
         </p:nvSpPr>
         <p:spPr>
           <a:xfrm>
-            <a:off x="628650" y="1825625"/>
-            <a:ext cx="7886700" cy="4351338"/>
+            <a:off x="628650" y="1509099"/>
+            <a:ext cx="7886700" cy="3596905"/>
           </a:xfrm>
           <a:prstGeom prst="rect">
             <a:avLst/>
@@ -2538,8 +2542,8 @@
         </p:nvSpPr>
         <p:spPr>
           <a:xfrm>
-            <a:off x="628650" y="6356351"/>
-            <a:ext cx="2057400" cy="365125"/>
+            <a:off x="628650" y="5254289"/>
+            <a:ext cx="2057400" cy="301820"/>
           </a:xfrm>
           <a:prstGeom prst="rect">
             <a:avLst/>
@@ -2549,7 +2553,7 @@
           <a:bodyPr vert="horz" lIns="91440" tIns="45720" rIns="91440" bIns="45720" rtlCol="0" anchor="ctr"/>
           <a:lstStyle>
             <a:lvl1pPr algn="l">
-              <a:defRPr sz="1200">
+              <a:defRPr sz="900">
                 <a:solidFill>
                   <a:schemeClr val="tx1">
                     <a:tint val="75000"/>
@@ -2559,9 +2563,9 @@
             </a:lvl1pPr>
           </a:lstStyle>
           <a:p>
-            <a:fld id="{2ED5CD3F-891E-4565-954D-8C78C6B7330B}" type="datetimeFigureOut">
+            <a:fld id="{12FD65F8-89BB-42A3-B7C5-99E87ABACD03}" type="datetimeFigureOut">
               <a:rPr lang="en-US" smtClean="0"/>
-              <a:t>10/3/2022</a:t>
+              <a:t>10/6/2022</a:t>
             </a:fld>
             <a:endParaRPr lang="en-US"/>
           </a:p>
@@ -2579,8 +2583,8 @@
         </p:nvSpPr>
         <p:spPr>
           <a:xfrm>
-            <a:off x="3028950" y="6356351"/>
-            <a:ext cx="3086100" cy="365125"/>
+            <a:off x="3028950" y="5254289"/>
+            <a:ext cx="3086100" cy="301820"/>
           </a:xfrm>
           <a:prstGeom prst="rect">
             <a:avLst/>
@@ -2590,7 +2594,7 @@
           <a:bodyPr vert="horz" lIns="91440" tIns="45720" rIns="91440" bIns="45720" rtlCol="0" anchor="ctr"/>
           <a:lstStyle>
             <a:lvl1pPr algn="ctr">
-              <a:defRPr sz="1200">
+              <a:defRPr sz="900">
                 <a:solidFill>
                   <a:schemeClr val="tx1">
                     <a:tint val="75000"/>
@@ -2616,8 +2620,8 @@
         </p:nvSpPr>
         <p:spPr>
           <a:xfrm>
-            <a:off x="6457950" y="6356351"/>
-            <a:ext cx="2057400" cy="365125"/>
+            <a:off x="6457950" y="5254289"/>
+            <a:ext cx="2057400" cy="301820"/>
           </a:xfrm>
           <a:prstGeom prst="rect">
             <a:avLst/>
@@ -2627,7 +2631,7 @@
           <a:bodyPr vert="horz" lIns="91440" tIns="45720" rIns="91440" bIns="45720" rtlCol="0" anchor="ctr"/>
           <a:lstStyle>
             <a:lvl1pPr algn="r">
-              <a:defRPr sz="1200">
+              <a:defRPr sz="900">
                 <a:solidFill>
                   <a:schemeClr val="tx1">
                     <a:tint val="75000"/>
@@ -2637,7 +2641,7 @@
             </a:lvl1pPr>
           </a:lstStyle>
           <a:p>
-            <a:fld id="{4744FD22-82CA-4BEA-ACC8-12A6322D3ADD}" type="slidenum">
+            <a:fld id="{E8D8730A-BBD7-4364-871B-2AD73562DE47}" type="slidenum">
               <a:rPr lang="en-US" smtClean="0"/>
               <a:t>‹#›</a:t>
             </a:fld>
@@ -2648,27 +2652,27 @@
     </p:spTree>
     <p:extLst>
       <p:ext uri="{BB962C8B-B14F-4D97-AF65-F5344CB8AC3E}">
-        <p14:creationId xmlns:p14="http://schemas.microsoft.com/office/powerpoint/2010/main" val="3038083751"/>
+        <p14:creationId xmlns:p14="http://schemas.microsoft.com/office/powerpoint/2010/main" val="1461378872"/>
       </p:ext>
     </p:extLst>
   </p:cSld>
   <p:clrMap bg1="lt1" tx1="dk1" bg2="lt2" tx2="dk2" accent1="accent1" accent2="accent2" accent3="accent3" accent4="accent4" accent5="accent5" accent6="accent6" hlink="hlink" folHlink="folHlink"/>
   <p:sldLayoutIdLst>
-    <p:sldLayoutId id="2147483661" r:id="rId1"/>
-    <p:sldLayoutId id="2147483662" r:id="rId2"/>
-    <p:sldLayoutId id="2147483663" r:id="rId3"/>
-    <p:sldLayoutId id="2147483664" r:id="rId4"/>
-    <p:sldLayoutId id="2147483665" r:id="rId5"/>
-    <p:sldLayoutId id="2147483666" r:id="rId6"/>
-    <p:sldLayoutId id="2147483667" r:id="rId7"/>
-    <p:sldLayoutId id="2147483668" r:id="rId8"/>
-    <p:sldLayoutId id="2147483669" r:id="rId9"/>
-    <p:sldLayoutId id="2147483670" r:id="rId10"/>
-    <p:sldLayoutId id="2147483671" r:id="rId11"/>
+    <p:sldLayoutId id="2147483685" r:id="rId1"/>
+    <p:sldLayoutId id="2147483686" r:id="rId2"/>
+    <p:sldLayoutId id="2147483687" r:id="rId3"/>
+    <p:sldLayoutId id="2147483688" r:id="rId4"/>
+    <p:sldLayoutId id="2147483689" r:id="rId5"/>
+    <p:sldLayoutId id="2147483690" r:id="rId6"/>
+    <p:sldLayoutId id="2147483691" r:id="rId7"/>
+    <p:sldLayoutId id="2147483692" r:id="rId8"/>
+    <p:sldLayoutId id="2147483693" r:id="rId9"/>
+    <p:sldLayoutId id="2147483694" r:id="rId10"/>
+    <p:sldLayoutId id="2147483695" r:id="rId11"/>
   </p:sldLayoutIdLst>
   <p:txStyles>
     <p:titleStyle>
-      <a:lvl1pPr algn="l" defTabSz="914400" rtl="0" eaLnBrk="1" latinLnBrk="0" hangingPunct="1">
+      <a:lvl1pPr algn="l" defTabSz="685800" rtl="0" eaLnBrk="1" latinLnBrk="0" hangingPunct="1">
         <a:lnSpc>
           <a:spcPct val="90000"/>
         </a:lnSpc>
@@ -2676,7 +2680,7 @@
           <a:spcPct val="0"/>
         </a:spcBef>
         <a:buNone/>
-        <a:defRPr sz="4400" kern="1200">
+        <a:defRPr sz="3300" kern="1200">
           <a:solidFill>
             <a:schemeClr val="tx1"/>
           </a:solidFill>
@@ -2687,16 +2691,16 @@
       </a:lvl1pPr>
     </p:titleStyle>
     <p:bodyStyle>
-      <a:lvl1pPr marL="228600" indent="-228600" algn="l" defTabSz="914400" rtl="0" eaLnBrk="1" latinLnBrk="0" hangingPunct="1">
+      <a:lvl1pPr marL="171450" indent="-171450" algn="l" defTabSz="685800" rtl="0" eaLnBrk="1" latinLnBrk="0" hangingPunct="1">
         <a:lnSpc>
           <a:spcPct val="90000"/>
         </a:lnSpc>
         <a:spcBef>
-          <a:spcPts val="1000"/>
+          <a:spcPts val="750"/>
         </a:spcBef>
         <a:buFont typeface="Arial" panose="020B0604020202020204" pitchFamily="34" charset="0"/>
         <a:buChar char="•"/>
-        <a:defRPr sz="2800" kern="1200">
+        <a:defRPr sz="2100" kern="1200">
           <a:solidFill>
             <a:schemeClr val="tx1"/>
           </a:solidFill>
@@ -2705,48 +2709,12 @@
           <a:cs typeface="+mn-cs"/>
         </a:defRPr>
       </a:lvl1pPr>
-      <a:lvl2pPr marL="685800" indent="-228600" algn="l" defTabSz="914400" rtl="0" eaLnBrk="1" latinLnBrk="0" hangingPunct="1">
+      <a:lvl2pPr marL="514350" indent="-171450" algn="l" defTabSz="685800" rtl="0" eaLnBrk="1" latinLnBrk="0" hangingPunct="1">
         <a:lnSpc>
           <a:spcPct val="90000"/>
         </a:lnSpc>
         <a:spcBef>
-          <a:spcPts val="500"/>
-        </a:spcBef>
-        <a:buFont typeface="Arial" panose="020B0604020202020204" pitchFamily="34" charset="0"/>
-        <a:buChar char="•"/>
-        <a:defRPr sz="2400" kern="1200">
-          <a:solidFill>
-            <a:schemeClr val="tx1"/>
-          </a:solidFill>
-          <a:latin typeface="+mn-lt"/>
-          <a:ea typeface="+mn-ea"/>
-          <a:cs typeface="+mn-cs"/>
-        </a:defRPr>
-      </a:lvl2pPr>
-      <a:lvl3pPr marL="1143000" indent="-228600" algn="l" defTabSz="914400" rtl="0" eaLnBrk="1" latinLnBrk="0" hangingPunct="1">
-        <a:lnSpc>
-          <a:spcPct val="90000"/>
-        </a:lnSpc>
-        <a:spcBef>
-          <a:spcPts val="500"/>
-        </a:spcBef>
-        <a:buFont typeface="Arial" panose="020B0604020202020204" pitchFamily="34" charset="0"/>
-        <a:buChar char="•"/>
-        <a:defRPr sz="2000" kern="1200">
-          <a:solidFill>
-            <a:schemeClr val="tx1"/>
-          </a:solidFill>
-          <a:latin typeface="+mn-lt"/>
-          <a:ea typeface="+mn-ea"/>
-          <a:cs typeface="+mn-cs"/>
-        </a:defRPr>
-      </a:lvl3pPr>
-      <a:lvl4pPr marL="1600200" indent="-228600" algn="l" defTabSz="914400" rtl="0" eaLnBrk="1" latinLnBrk="0" hangingPunct="1">
-        <a:lnSpc>
-          <a:spcPct val="90000"/>
-        </a:lnSpc>
-        <a:spcBef>
-          <a:spcPts val="500"/>
+          <a:spcPts val="375"/>
         </a:spcBef>
         <a:buFont typeface="Arial" panose="020B0604020202020204" pitchFamily="34" charset="0"/>
         <a:buChar char="•"/>
@@ -2758,17 +2726,53 @@
           <a:ea typeface="+mn-ea"/>
           <a:cs typeface="+mn-cs"/>
         </a:defRPr>
-      </a:lvl4pPr>
-      <a:lvl5pPr marL="2057400" indent="-228600" algn="l" defTabSz="914400" rtl="0" eaLnBrk="1" latinLnBrk="0" hangingPunct="1">
+      </a:lvl2pPr>
+      <a:lvl3pPr marL="857250" indent="-171450" algn="l" defTabSz="685800" rtl="0" eaLnBrk="1" latinLnBrk="0" hangingPunct="1">
         <a:lnSpc>
           <a:spcPct val="90000"/>
         </a:lnSpc>
         <a:spcBef>
-          <a:spcPts val="500"/>
+          <a:spcPts val="375"/>
         </a:spcBef>
         <a:buFont typeface="Arial" panose="020B0604020202020204" pitchFamily="34" charset="0"/>
         <a:buChar char="•"/>
-        <a:defRPr sz="1800" kern="1200">
+        <a:defRPr sz="1500" kern="1200">
+          <a:solidFill>
+            <a:schemeClr val="tx1"/>
+          </a:solidFill>
+          <a:latin typeface="+mn-lt"/>
+          <a:ea typeface="+mn-ea"/>
+          <a:cs typeface="+mn-cs"/>
+        </a:defRPr>
+      </a:lvl3pPr>
+      <a:lvl4pPr marL="1200150" indent="-171450" algn="l" defTabSz="685800" rtl="0" eaLnBrk="1" latinLnBrk="0" hangingPunct="1">
+        <a:lnSpc>
+          <a:spcPct val="90000"/>
+        </a:lnSpc>
+        <a:spcBef>
+          <a:spcPts val="375"/>
+        </a:spcBef>
+        <a:buFont typeface="Arial" panose="020B0604020202020204" pitchFamily="34" charset="0"/>
+        <a:buChar char="•"/>
+        <a:defRPr sz="1350" kern="1200">
+          <a:solidFill>
+            <a:schemeClr val="tx1"/>
+          </a:solidFill>
+          <a:latin typeface="+mn-lt"/>
+          <a:ea typeface="+mn-ea"/>
+          <a:cs typeface="+mn-cs"/>
+        </a:defRPr>
+      </a:lvl4pPr>
+      <a:lvl5pPr marL="1543050" indent="-171450" algn="l" defTabSz="685800" rtl="0" eaLnBrk="1" latinLnBrk="0" hangingPunct="1">
+        <a:lnSpc>
+          <a:spcPct val="90000"/>
+        </a:lnSpc>
+        <a:spcBef>
+          <a:spcPts val="375"/>
+        </a:spcBef>
+        <a:buFont typeface="Arial" panose="020B0604020202020204" pitchFamily="34" charset="0"/>
+        <a:buChar char="•"/>
+        <a:defRPr sz="1350" kern="1200">
           <a:solidFill>
             <a:schemeClr val="tx1"/>
           </a:solidFill>
@@ -2777,16 +2781,16 @@
           <a:cs typeface="+mn-cs"/>
         </a:defRPr>
       </a:lvl5pPr>
-      <a:lvl6pPr marL="2514600" indent="-228600" algn="l" defTabSz="914400" rtl="0" eaLnBrk="1" latinLnBrk="0" hangingPunct="1">
+      <a:lvl6pPr marL="1885950" indent="-171450" algn="l" defTabSz="685800" rtl="0" eaLnBrk="1" latinLnBrk="0" hangingPunct="1">
         <a:lnSpc>
           <a:spcPct val="90000"/>
         </a:lnSpc>
         <a:spcBef>
-          <a:spcPts val="500"/>
+          <a:spcPts val="375"/>
         </a:spcBef>
         <a:buFont typeface="Arial" panose="020B0604020202020204" pitchFamily="34" charset="0"/>
         <a:buChar char="•"/>
-        <a:defRPr sz="1800" kern="1200">
+        <a:defRPr sz="1350" kern="1200">
           <a:solidFill>
             <a:schemeClr val="tx1"/>
           </a:solidFill>
@@ -2795,16 +2799,16 @@
           <a:cs typeface="+mn-cs"/>
         </a:defRPr>
       </a:lvl6pPr>
-      <a:lvl7pPr marL="2971800" indent="-228600" algn="l" defTabSz="914400" rtl="0" eaLnBrk="1" latinLnBrk="0" hangingPunct="1">
+      <a:lvl7pPr marL="2228850" indent="-171450" algn="l" defTabSz="685800" rtl="0" eaLnBrk="1" latinLnBrk="0" hangingPunct="1">
         <a:lnSpc>
           <a:spcPct val="90000"/>
         </a:lnSpc>
         <a:spcBef>
-          <a:spcPts val="500"/>
+          <a:spcPts val="375"/>
         </a:spcBef>
         <a:buFont typeface="Arial" panose="020B0604020202020204" pitchFamily="34" charset="0"/>
         <a:buChar char="•"/>
-        <a:defRPr sz="1800" kern="1200">
+        <a:defRPr sz="1350" kern="1200">
           <a:solidFill>
             <a:schemeClr val="tx1"/>
           </a:solidFill>
@@ -2813,16 +2817,16 @@
           <a:cs typeface="+mn-cs"/>
         </a:defRPr>
       </a:lvl7pPr>
-      <a:lvl8pPr marL="3429000" indent="-228600" algn="l" defTabSz="914400" rtl="0" eaLnBrk="1" latinLnBrk="0" hangingPunct="1">
+      <a:lvl8pPr marL="2571750" indent="-171450" algn="l" defTabSz="685800" rtl="0" eaLnBrk="1" latinLnBrk="0" hangingPunct="1">
         <a:lnSpc>
           <a:spcPct val="90000"/>
         </a:lnSpc>
         <a:spcBef>
-          <a:spcPts val="500"/>
+          <a:spcPts val="375"/>
         </a:spcBef>
         <a:buFont typeface="Arial" panose="020B0604020202020204" pitchFamily="34" charset="0"/>
         <a:buChar char="•"/>
-        <a:defRPr sz="1800" kern="1200">
+        <a:defRPr sz="1350" kern="1200">
           <a:solidFill>
             <a:schemeClr val="tx1"/>
           </a:solidFill>
@@ -2831,16 +2835,16 @@
           <a:cs typeface="+mn-cs"/>
         </a:defRPr>
       </a:lvl8pPr>
-      <a:lvl9pPr marL="3886200" indent="-228600" algn="l" defTabSz="914400" rtl="0" eaLnBrk="1" latinLnBrk="0" hangingPunct="1">
+      <a:lvl9pPr marL="2914650" indent="-171450" algn="l" defTabSz="685800" rtl="0" eaLnBrk="1" latinLnBrk="0" hangingPunct="1">
         <a:lnSpc>
           <a:spcPct val="90000"/>
         </a:lnSpc>
         <a:spcBef>
-          <a:spcPts val="500"/>
+          <a:spcPts val="375"/>
         </a:spcBef>
         <a:buFont typeface="Arial" panose="020B0604020202020204" pitchFamily="34" charset="0"/>
         <a:buChar char="•"/>
-        <a:defRPr sz="1800" kern="1200">
+        <a:defRPr sz="1350" kern="1200">
           <a:solidFill>
             <a:schemeClr val="tx1"/>
           </a:solidFill>
@@ -2854,8 +2858,8 @@
       <a:defPPr>
         <a:defRPr lang="en-US"/>
       </a:defPPr>
-      <a:lvl1pPr marL="0" algn="l" defTabSz="914400" rtl="0" eaLnBrk="1" latinLnBrk="0" hangingPunct="1">
-        <a:defRPr sz="1800" kern="1200">
+      <a:lvl1pPr marL="0" algn="l" defTabSz="685800" rtl="0" eaLnBrk="1" latinLnBrk="0" hangingPunct="1">
+        <a:defRPr sz="1350" kern="1200">
           <a:solidFill>
             <a:schemeClr val="tx1"/>
           </a:solidFill>
@@ -2864,8 +2868,8 @@
           <a:cs typeface="+mn-cs"/>
         </a:defRPr>
       </a:lvl1pPr>
-      <a:lvl2pPr marL="457200" algn="l" defTabSz="914400" rtl="0" eaLnBrk="1" latinLnBrk="0" hangingPunct="1">
-        <a:defRPr sz="1800" kern="1200">
+      <a:lvl2pPr marL="342900" algn="l" defTabSz="685800" rtl="0" eaLnBrk="1" latinLnBrk="0" hangingPunct="1">
+        <a:defRPr sz="1350" kern="1200">
           <a:solidFill>
             <a:schemeClr val="tx1"/>
           </a:solidFill>
@@ -2874,8 +2878,8 @@
           <a:cs typeface="+mn-cs"/>
         </a:defRPr>
       </a:lvl2pPr>
-      <a:lvl3pPr marL="914400" algn="l" defTabSz="914400" rtl="0" eaLnBrk="1" latinLnBrk="0" hangingPunct="1">
-        <a:defRPr sz="1800" kern="1200">
+      <a:lvl3pPr marL="685800" algn="l" defTabSz="685800" rtl="0" eaLnBrk="1" latinLnBrk="0" hangingPunct="1">
+        <a:defRPr sz="1350" kern="1200">
           <a:solidFill>
             <a:schemeClr val="tx1"/>
           </a:solidFill>
@@ -2884,8 +2888,8 @@
           <a:cs typeface="+mn-cs"/>
         </a:defRPr>
       </a:lvl3pPr>
-      <a:lvl4pPr marL="1371600" algn="l" defTabSz="914400" rtl="0" eaLnBrk="1" latinLnBrk="0" hangingPunct="1">
-        <a:defRPr sz="1800" kern="1200">
+      <a:lvl4pPr marL="1028700" algn="l" defTabSz="685800" rtl="0" eaLnBrk="1" latinLnBrk="0" hangingPunct="1">
+        <a:defRPr sz="1350" kern="1200">
           <a:solidFill>
             <a:schemeClr val="tx1"/>
           </a:solidFill>
@@ -2894,8 +2898,8 @@
           <a:cs typeface="+mn-cs"/>
         </a:defRPr>
       </a:lvl4pPr>
-      <a:lvl5pPr marL="1828800" algn="l" defTabSz="914400" rtl="0" eaLnBrk="1" latinLnBrk="0" hangingPunct="1">
-        <a:defRPr sz="1800" kern="1200">
+      <a:lvl5pPr marL="1371600" algn="l" defTabSz="685800" rtl="0" eaLnBrk="1" latinLnBrk="0" hangingPunct="1">
+        <a:defRPr sz="1350" kern="1200">
           <a:solidFill>
             <a:schemeClr val="tx1"/>
           </a:solidFill>
@@ -2904,8 +2908,8 @@
           <a:cs typeface="+mn-cs"/>
         </a:defRPr>
       </a:lvl5pPr>
-      <a:lvl6pPr marL="2286000" algn="l" defTabSz="914400" rtl="0" eaLnBrk="1" latinLnBrk="0" hangingPunct="1">
-        <a:defRPr sz="1800" kern="1200">
+      <a:lvl6pPr marL="1714500" algn="l" defTabSz="685800" rtl="0" eaLnBrk="1" latinLnBrk="0" hangingPunct="1">
+        <a:defRPr sz="1350" kern="1200">
           <a:solidFill>
             <a:schemeClr val="tx1"/>
           </a:solidFill>
@@ -2914,8 +2918,8 @@
           <a:cs typeface="+mn-cs"/>
         </a:defRPr>
       </a:lvl6pPr>
-      <a:lvl7pPr marL="2743200" algn="l" defTabSz="914400" rtl="0" eaLnBrk="1" latinLnBrk="0" hangingPunct="1">
-        <a:defRPr sz="1800" kern="1200">
+      <a:lvl7pPr marL="2057400" algn="l" defTabSz="685800" rtl="0" eaLnBrk="1" latinLnBrk="0" hangingPunct="1">
+        <a:defRPr sz="1350" kern="1200">
           <a:solidFill>
             <a:schemeClr val="tx1"/>
           </a:solidFill>
@@ -2924,8 +2928,8 @@
           <a:cs typeface="+mn-cs"/>
         </a:defRPr>
       </a:lvl7pPr>
-      <a:lvl8pPr marL="3200400" algn="l" defTabSz="914400" rtl="0" eaLnBrk="1" latinLnBrk="0" hangingPunct="1">
-        <a:defRPr sz="1800" kern="1200">
+      <a:lvl8pPr marL="2400300" algn="l" defTabSz="685800" rtl="0" eaLnBrk="1" latinLnBrk="0" hangingPunct="1">
+        <a:defRPr sz="1350" kern="1200">
           <a:solidFill>
             <a:schemeClr val="tx1"/>
           </a:solidFill>
@@ -2934,8 +2938,8 @@
           <a:cs typeface="+mn-cs"/>
         </a:defRPr>
       </a:lvl8pPr>
-      <a:lvl9pPr marL="3657600" algn="l" defTabSz="914400" rtl="0" eaLnBrk="1" latinLnBrk="0" hangingPunct="1">
-        <a:defRPr sz="1800" kern="1200">
+      <a:lvl9pPr marL="2743200" algn="l" defTabSz="685800" rtl="0" eaLnBrk="1" latinLnBrk="0" hangingPunct="1">
+        <a:defRPr sz="1350" kern="1200">
           <a:solidFill>
             <a:schemeClr val="tx1"/>
           </a:solidFill>
@@ -2966,12 +2970,97 @@
           <a:chExt cx="0" cy="0"/>
         </a:xfrm>
       </p:grpSpPr>
-      <p:sp>
-        <p:nvSpPr>
-          <p:cNvPr id="4" name="TextBox 3">
+      <p:pic>
+        <p:nvPicPr>
+          <p:cNvPr id="5" name="Picture 4" descr="Diagram&#10;&#10;Description automatically generated">
             <a:extLst>
               <a:ext uri="{FF2B5EF4-FFF2-40B4-BE49-F238E27FC236}">
-                <a16:creationId xmlns:a16="http://schemas.microsoft.com/office/drawing/2014/main" id="{49EC50E4-7A5D-491A-A7AB-4B072F834438}"/>
+                <a16:creationId xmlns:a16="http://schemas.microsoft.com/office/drawing/2014/main" id="{D52F35F4-998A-4FF5-8B62-DB6F065AF1A4}"/>
+              </a:ext>
+            </a:extLst>
+          </p:cNvPr>
+          <p:cNvPicPr>
+            <a:picLocks noChangeAspect="1"/>
+          </p:cNvPicPr>
+          <p:nvPr/>
+        </p:nvPicPr>
+        <p:blipFill rotWithShape="1">
+          <a:blip r:embed="rId2">
+            <a:extLst>
+              <a:ext uri="{28A0092B-C50C-407E-A947-70E740481C1C}">
+                <a14:useLocalDpi xmlns:a14="http://schemas.microsoft.com/office/drawing/2010/main" val="0"/>
+              </a:ext>
+            </a:extLst>
+          </a:blip>
+          <a:srcRect b="10664"/>
+          <a:stretch/>
+        </p:blipFill>
+        <p:spPr>
+          <a:xfrm>
+            <a:off x="0" y="0"/>
+            <a:ext cx="9144000" cy="5222929"/>
+          </a:xfrm>
+          <a:prstGeom prst="rect">
+            <a:avLst/>
+          </a:prstGeom>
+        </p:spPr>
+      </p:pic>
+      <p:sp>
+        <p:nvSpPr>
+          <p:cNvPr id="8" name="Rectangle 7">
+            <a:extLst>
+              <a:ext uri="{FF2B5EF4-FFF2-40B4-BE49-F238E27FC236}">
+                <a16:creationId xmlns:a16="http://schemas.microsoft.com/office/drawing/2014/main" id="{D35678C0-E437-4CC9-BF70-AC4387C7F261}"/>
+              </a:ext>
+            </a:extLst>
+          </p:cNvPr>
+          <p:cNvSpPr/>
+          <p:nvPr/>
+        </p:nvSpPr>
+        <p:spPr>
+          <a:xfrm>
+            <a:off x="211197" y="57271"/>
+            <a:ext cx="2471979" cy="3494868"/>
+          </a:xfrm>
+          <a:prstGeom prst="rect">
+            <a:avLst/>
+          </a:prstGeom>
+          <a:noFill/>
+          <a:ln w="38100">
+            <a:solidFill>
+              <a:schemeClr val="accent6"/>
+            </a:solidFill>
+          </a:ln>
+        </p:spPr>
+        <p:style>
+          <a:lnRef idx="2">
+            <a:schemeClr val="accent2"/>
+          </a:lnRef>
+          <a:fillRef idx="1">
+            <a:schemeClr val="lt1"/>
+          </a:fillRef>
+          <a:effectRef idx="0">
+            <a:schemeClr val="accent2"/>
+          </a:effectRef>
+          <a:fontRef idx="minor">
+            <a:schemeClr val="dk1"/>
+          </a:fontRef>
+        </p:style>
+        <p:txBody>
+          <a:bodyPr rtlCol="0" anchor="ctr"/>
+          <a:lstStyle/>
+          <a:p>
+            <a:pPr algn="ctr"/>
+            <a:endParaRPr lang="en-US"/>
+          </a:p>
+        </p:txBody>
+      </p:sp>
+      <p:sp>
+        <p:nvSpPr>
+          <p:cNvPr id="9" name="TextBox 8">
+            <a:extLst>
+              <a:ext uri="{FF2B5EF4-FFF2-40B4-BE49-F238E27FC236}">
+                <a16:creationId xmlns:a16="http://schemas.microsoft.com/office/drawing/2014/main" id="{142BF0BE-F557-401C-A6F7-3CA868C169FB}"/>
               </a:ext>
             </a:extLst>
           </p:cNvPr>
@@ -2980,8 +3069,8 @@
         </p:nvSpPr>
         <p:spPr>
           <a:xfrm>
-            <a:off x="824171" y="1381410"/>
-            <a:ext cx="7495658" cy="3139321"/>
+            <a:off x="0" y="3664857"/>
+            <a:ext cx="3127972" cy="369332"/>
           </a:xfrm>
           <a:prstGeom prst="rect">
             <a:avLst/>
@@ -2989,98 +3078,143 @@
           <a:noFill/>
         </p:spPr>
         <p:txBody>
-          <a:bodyPr wrap="square" rtlCol="0">
+          <a:bodyPr wrap="none" rtlCol="0">
             <a:spAutoFit/>
           </a:bodyPr>
           <a:lstStyle/>
           <a:p>
-            <a:pPr algn="ctr"/>
             <a:r>
               <a:rPr lang="en-US" dirty="0">
-                <a:latin typeface="Arial" panose="020B0604020202020204" pitchFamily="34" charset="0"/>
-                <a:cs typeface="Arial" panose="020B0604020202020204" pitchFamily="34" charset="0"/>
+                <a:solidFill>
+                  <a:schemeClr val="accent6"/>
+                </a:solidFill>
               </a:rPr>
-              <a:t>In this task, you will see black or white beads being drawn (pulled) from jars.</a:t>
-            </a:r>
-          </a:p>
-          <a:p>
-            <a:pPr algn="ctr"/>
-            <a:endParaRPr lang="en-US" dirty="0">
-              <a:latin typeface="Arial" panose="020B0604020202020204" pitchFamily="34" charset="0"/>
-              <a:cs typeface="Arial" panose="020B0604020202020204" pitchFamily="34" charset="0"/>
-            </a:endParaRPr>
-          </a:p>
-          <a:p>
-            <a:pPr algn="ctr"/>
-            <a:r>
-              <a:rPr lang="en-US" dirty="0">
-                <a:latin typeface="Arial" panose="020B0604020202020204" pitchFamily="34" charset="0"/>
-                <a:cs typeface="Arial" panose="020B0604020202020204" pitchFamily="34" charset="0"/>
-              </a:rPr>
-              <a:t>On each trial, a bead will be drawn from one of two jars. Once you see this bead, your goal is to predict the color of the </a:t>
-            </a:r>
-            <a:r>
-              <a:rPr lang="en-US" b="1" dirty="0">
-                <a:latin typeface="Arial" panose="020B0604020202020204" pitchFamily="34" charset="0"/>
-                <a:cs typeface="Arial" panose="020B0604020202020204" pitchFamily="34" charset="0"/>
-              </a:rPr>
-              <a:t>NEXT</a:t>
-            </a:r>
-            <a:r>
-              <a:rPr lang="en-US" dirty="0">
-                <a:latin typeface="Arial" panose="020B0604020202020204" pitchFamily="34" charset="0"/>
-                <a:cs typeface="Arial" panose="020B0604020202020204" pitchFamily="34" charset="0"/>
-              </a:rPr>
-              <a:t> bead.</a:t>
-            </a:r>
-          </a:p>
-          <a:p>
-            <a:pPr algn="ctr"/>
-            <a:endParaRPr lang="en-US" dirty="0">
-              <a:latin typeface="Arial" panose="020B0604020202020204" pitchFamily="34" charset="0"/>
-              <a:cs typeface="Arial" panose="020B0604020202020204" pitchFamily="34" charset="0"/>
-            </a:endParaRPr>
-          </a:p>
-          <a:p>
-            <a:pPr algn="ctr"/>
-            <a:r>
-              <a:rPr lang="en-US" dirty="0">
-                <a:latin typeface="Arial" panose="020B0604020202020204" pitchFamily="34" charset="0"/>
-                <a:cs typeface="Arial" panose="020B0604020202020204" pitchFamily="34" charset="0"/>
-              </a:rPr>
-              <a:t>Every time you correctly guess the color of the </a:t>
-            </a:r>
-            <a:r>
-              <a:rPr lang="en-US" b="1" dirty="0">
-                <a:latin typeface="Arial" panose="020B0604020202020204" pitchFamily="34" charset="0"/>
-                <a:cs typeface="Arial" panose="020B0604020202020204" pitchFamily="34" charset="0"/>
-              </a:rPr>
-              <a:t>NEXT </a:t>
-            </a:r>
-            <a:r>
-              <a:rPr lang="en-US" dirty="0">
-                <a:latin typeface="Arial" panose="020B0604020202020204" pitchFamily="34" charset="0"/>
-                <a:cs typeface="Arial" panose="020B0604020202020204" pitchFamily="34" charset="0"/>
-              </a:rPr>
-              <a:t>bead, you will get a point. The more points you get, the higher your bonus will be at the end of the experiment.</a:t>
-            </a:r>
-          </a:p>
-          <a:p>
-            <a:pPr algn="ctr"/>
-            <a:endParaRPr lang="en-US" dirty="0"/>
-          </a:p>
-          <a:p>
-            <a:pPr algn="ctr"/>
-            <a:endParaRPr lang="en-US" dirty="0"/>
-          </a:p>
-        </p:txBody>
-      </p:sp>
-      <p:sp>
-        <p:nvSpPr>
-          <p:cNvPr id="5" name="TextBox 4">
+              <a:t>Center bead came from this jar.</a:t>
+            </a:r>
+          </a:p>
+        </p:txBody>
+      </p:sp>
+    </p:spTree>
+    <p:extLst>
+      <p:ext uri="{BB962C8B-B14F-4D97-AF65-F5344CB8AC3E}">
+        <p14:creationId xmlns:p14="http://schemas.microsoft.com/office/powerpoint/2010/main" val="222611398"/>
+      </p:ext>
+    </p:extLst>
+  </p:cSld>
+  <p:clrMapOvr>
+    <a:masterClrMapping/>
+  </p:clrMapOvr>
+</p:sld>
+</file>
+
+<file path=ppt/slides/slide2.xml><?xml version="1.0" encoding="utf-8"?>
+<p:sld xmlns:a="http://schemas.openxmlformats.org/drawingml/2006/main" xmlns:r="http://schemas.openxmlformats.org/officeDocument/2006/relationships" xmlns:p="http://schemas.openxmlformats.org/presentationml/2006/main">
+  <p:cSld>
+    <p:spTree>
+      <p:nvGrpSpPr>
+        <p:cNvPr id="1" name=""/>
+        <p:cNvGrpSpPr/>
+        <p:nvPr/>
+      </p:nvGrpSpPr>
+      <p:grpSpPr>
+        <a:xfrm>
+          <a:off x="0" y="0"/>
+          <a:ext cx="0" cy="0"/>
+          <a:chOff x="0" y="0"/>
+          <a:chExt cx="0" cy="0"/>
+        </a:xfrm>
+      </p:grpSpPr>
+      <p:pic>
+        <p:nvPicPr>
+          <p:cNvPr id="3" name="Picture 2" descr="Diagram&#10;&#10;Description automatically generated">
             <a:extLst>
               <a:ext uri="{FF2B5EF4-FFF2-40B4-BE49-F238E27FC236}">
-                <a16:creationId xmlns:a16="http://schemas.microsoft.com/office/drawing/2014/main" id="{58000161-E1A3-4ED3-97C1-814CAEF2631E}"/>
+                <a16:creationId xmlns:a16="http://schemas.microsoft.com/office/drawing/2014/main" id="{2FCCBACE-92AB-444D-A3A5-8FA63A2520C2}"/>
+              </a:ext>
+            </a:extLst>
+          </p:cNvPr>
+          <p:cNvPicPr>
+            <a:picLocks noChangeAspect="1"/>
+          </p:cNvPicPr>
+          <p:nvPr/>
+        </p:nvPicPr>
+        <p:blipFill rotWithShape="1">
+          <a:blip r:embed="rId2">
+            <a:extLst>
+              <a:ext uri="{28A0092B-C50C-407E-A947-70E740481C1C}">
+                <a14:useLocalDpi xmlns:a14="http://schemas.microsoft.com/office/drawing/2010/main" val="0"/>
+              </a:ext>
+            </a:extLst>
+          </a:blip>
+          <a:srcRect t="996" b="9476"/>
+          <a:stretch/>
+        </p:blipFill>
+        <p:spPr>
+          <a:xfrm>
+            <a:off x="101752" y="86299"/>
+            <a:ext cx="8940495" cy="5153358"/>
+          </a:xfrm>
+          <a:prstGeom prst="rect">
+            <a:avLst/>
+          </a:prstGeom>
+        </p:spPr>
+      </p:pic>
+      <p:sp>
+        <p:nvSpPr>
+          <p:cNvPr id="7" name="Rectangle 6">
+            <a:extLst>
+              <a:ext uri="{FF2B5EF4-FFF2-40B4-BE49-F238E27FC236}">
+                <a16:creationId xmlns:a16="http://schemas.microsoft.com/office/drawing/2014/main" id="{39295F1F-04F8-4629-AEA2-60E2E7C7B4E9}"/>
+              </a:ext>
+            </a:extLst>
+          </p:cNvPr>
+          <p:cNvSpPr/>
+          <p:nvPr/>
+        </p:nvSpPr>
+        <p:spPr>
+          <a:xfrm>
+            <a:off x="6439053" y="86299"/>
+            <a:ext cx="2471979" cy="3494868"/>
+          </a:xfrm>
+          <a:prstGeom prst="rect">
+            <a:avLst/>
+          </a:prstGeom>
+          <a:noFill/>
+          <a:ln w="38100">
+            <a:solidFill>
+              <a:schemeClr val="accent6"/>
+            </a:solidFill>
+          </a:ln>
+        </p:spPr>
+        <p:style>
+          <a:lnRef idx="2">
+            <a:schemeClr val="accent2"/>
+          </a:lnRef>
+          <a:fillRef idx="1">
+            <a:schemeClr val="lt1"/>
+          </a:fillRef>
+          <a:effectRef idx="0">
+            <a:schemeClr val="accent2"/>
+          </a:effectRef>
+          <a:fontRef idx="minor">
+            <a:schemeClr val="dk1"/>
+          </a:fontRef>
+        </p:style>
+        <p:txBody>
+          <a:bodyPr rtlCol="0" anchor="ctr"/>
+          <a:lstStyle/>
+          <a:p>
+            <a:pPr algn="ctr"/>
+            <a:endParaRPr lang="en-US"/>
+          </a:p>
+        </p:txBody>
+      </p:sp>
+      <p:sp>
+        <p:nvSpPr>
+          <p:cNvPr id="10" name="TextBox 9">
+            <a:extLst>
+              <a:ext uri="{FF2B5EF4-FFF2-40B4-BE49-F238E27FC236}">
+                <a16:creationId xmlns:a16="http://schemas.microsoft.com/office/drawing/2014/main" id="{2FCF0C9C-945E-426E-BA47-3841A7A7CA03}"/>
               </a:ext>
             </a:extLst>
           </p:cNvPr>
@@ -3089,8 +3223,8 @@
         </p:nvSpPr>
         <p:spPr>
           <a:xfrm>
-            <a:off x="2712099" y="5107258"/>
-            <a:ext cx="3719801" cy="369332"/>
+            <a:off x="6111056" y="3664857"/>
+            <a:ext cx="3127972" cy="369332"/>
           </a:xfrm>
           <a:prstGeom prst="rect">
             <a:avLst/>
@@ -3103,13 +3237,13 @@
           </a:bodyPr>
           <a:lstStyle/>
           <a:p>
-            <a:pPr algn="ctr"/>
             <a:r>
               <a:rPr lang="en-US" dirty="0">
-                <a:latin typeface="Arial" panose="020B0604020202020204" pitchFamily="34" charset="0"/>
-                <a:cs typeface="Arial" panose="020B0604020202020204" pitchFamily="34" charset="0"/>
+                <a:solidFill>
+                  <a:schemeClr val="accent6"/>
+                </a:solidFill>
               </a:rPr>
-              <a:t>Press the SPACEBAR to continue.</a:t>
+              <a:t>Center bead came from this jar.</a:t>
             </a:r>
           </a:p>
         </p:txBody>
@@ -3117,7 +3251,161 @@
     </p:spTree>
     <p:extLst>
       <p:ext uri="{BB962C8B-B14F-4D97-AF65-F5344CB8AC3E}">
-        <p14:creationId xmlns:p14="http://schemas.microsoft.com/office/powerpoint/2010/main" val="2168871809"/>
+        <p14:creationId xmlns:p14="http://schemas.microsoft.com/office/powerpoint/2010/main" val="3513372145"/>
+      </p:ext>
+    </p:extLst>
+  </p:cSld>
+  <p:clrMapOvr>
+    <a:masterClrMapping/>
+  </p:clrMapOvr>
+</p:sld>
+</file>
+
+<file path=ppt/slides/slide3.xml><?xml version="1.0" encoding="utf-8"?>
+<p:sld xmlns:a="http://schemas.openxmlformats.org/drawingml/2006/main" xmlns:r="http://schemas.openxmlformats.org/officeDocument/2006/relationships" xmlns:p="http://schemas.openxmlformats.org/presentationml/2006/main">
+  <p:cSld>
+    <p:spTree>
+      <p:nvGrpSpPr>
+        <p:cNvPr id="1" name=""/>
+        <p:cNvGrpSpPr/>
+        <p:nvPr/>
+      </p:nvGrpSpPr>
+      <p:grpSpPr>
+        <a:xfrm>
+          <a:off x="0" y="0"/>
+          <a:ext cx="0" cy="0"/>
+          <a:chOff x="0" y="0"/>
+          <a:chExt cx="0" cy="0"/>
+        </a:xfrm>
+      </p:grpSpPr>
+      <p:pic>
+        <p:nvPicPr>
+          <p:cNvPr id="3" name="Picture 2" descr="Diagram&#10;&#10;Description automatically generated">
+            <a:extLst>
+              <a:ext uri="{FF2B5EF4-FFF2-40B4-BE49-F238E27FC236}">
+                <a16:creationId xmlns:a16="http://schemas.microsoft.com/office/drawing/2014/main" id="{2FCCBACE-92AB-444D-A3A5-8FA63A2520C2}"/>
+              </a:ext>
+            </a:extLst>
+          </p:cNvPr>
+          <p:cNvPicPr>
+            <a:picLocks noChangeAspect="1"/>
+          </p:cNvPicPr>
+          <p:nvPr/>
+        </p:nvPicPr>
+        <p:blipFill rotWithShape="1">
+          <a:blip r:embed="rId2">
+            <a:extLst>
+              <a:ext uri="{28A0092B-C50C-407E-A947-70E740481C1C}">
+                <a14:useLocalDpi xmlns:a14="http://schemas.microsoft.com/office/drawing/2010/main" val="0"/>
+              </a:ext>
+            </a:extLst>
+          </a:blip>
+          <a:srcRect t="996" b="9476"/>
+          <a:stretch/>
+        </p:blipFill>
+        <p:spPr>
+          <a:xfrm>
+            <a:off x="101752" y="86299"/>
+            <a:ext cx="8940495" cy="5153358"/>
+          </a:xfrm>
+          <a:prstGeom prst="rect">
+            <a:avLst/>
+          </a:prstGeom>
+        </p:spPr>
+      </p:pic>
+      <p:sp>
+        <p:nvSpPr>
+          <p:cNvPr id="8" name="Rectangle 7">
+            <a:extLst>
+              <a:ext uri="{FF2B5EF4-FFF2-40B4-BE49-F238E27FC236}">
+                <a16:creationId xmlns:a16="http://schemas.microsoft.com/office/drawing/2014/main" id="{D35678C0-E437-4CC9-BF70-AC4387C7F261}"/>
+              </a:ext>
+            </a:extLst>
+          </p:cNvPr>
+          <p:cNvSpPr/>
+          <p:nvPr/>
+        </p:nvSpPr>
+        <p:spPr>
+          <a:xfrm>
+            <a:off x="211197" y="57271"/>
+            <a:ext cx="2471979" cy="3494868"/>
+          </a:xfrm>
+          <a:prstGeom prst="rect">
+            <a:avLst/>
+          </a:prstGeom>
+          <a:noFill/>
+          <a:ln w="38100">
+            <a:solidFill>
+              <a:schemeClr val="accent6"/>
+            </a:solidFill>
+          </a:ln>
+        </p:spPr>
+        <p:style>
+          <a:lnRef idx="2">
+            <a:schemeClr val="accent2"/>
+          </a:lnRef>
+          <a:fillRef idx="1">
+            <a:schemeClr val="lt1"/>
+          </a:fillRef>
+          <a:effectRef idx="0">
+            <a:schemeClr val="accent2"/>
+          </a:effectRef>
+          <a:fontRef idx="minor">
+            <a:schemeClr val="dk1"/>
+          </a:fontRef>
+        </p:style>
+        <p:txBody>
+          <a:bodyPr rtlCol="0" anchor="ctr"/>
+          <a:lstStyle/>
+          <a:p>
+            <a:pPr algn="ctr"/>
+            <a:endParaRPr lang="en-US"/>
+          </a:p>
+        </p:txBody>
+      </p:sp>
+      <p:sp>
+        <p:nvSpPr>
+          <p:cNvPr id="9" name="TextBox 8">
+            <a:extLst>
+              <a:ext uri="{FF2B5EF4-FFF2-40B4-BE49-F238E27FC236}">
+                <a16:creationId xmlns:a16="http://schemas.microsoft.com/office/drawing/2014/main" id="{142BF0BE-F557-401C-A6F7-3CA868C169FB}"/>
+              </a:ext>
+            </a:extLst>
+          </p:cNvPr>
+          <p:cNvSpPr txBox="1"/>
+          <p:nvPr/>
+        </p:nvSpPr>
+        <p:spPr>
+          <a:xfrm>
+            <a:off x="0" y="3664857"/>
+            <a:ext cx="3127972" cy="369332"/>
+          </a:xfrm>
+          <a:prstGeom prst="rect">
+            <a:avLst/>
+          </a:prstGeom>
+          <a:noFill/>
+        </p:spPr>
+        <p:txBody>
+          <a:bodyPr wrap="none" rtlCol="0">
+            <a:spAutoFit/>
+          </a:bodyPr>
+          <a:lstStyle/>
+          <a:p>
+            <a:r>
+              <a:rPr lang="en-US" dirty="0">
+                <a:solidFill>
+                  <a:schemeClr val="accent6"/>
+                </a:solidFill>
+              </a:rPr>
+              <a:t>Center bead came from this jar.</a:t>
+            </a:r>
+          </a:p>
+        </p:txBody>
+      </p:sp>
+    </p:spTree>
+    <p:extLst>
+      <p:ext uri="{BB962C8B-B14F-4D97-AF65-F5344CB8AC3E}">
+        <p14:creationId xmlns:p14="http://schemas.microsoft.com/office/powerpoint/2010/main" val="2149715114"/>
       </p:ext>
     </p:extLst>
   </p:cSld>

</xml_diff>